<commit_message>
Production doc builds - 2021/07/06 22:47:43 UTC
</commit_message>
<xml_diff>
--- a/docs/images/new-relic-one-architecture-diagram.pptx
+++ b/docs/images/new-relic-one-architecture-diagram.pptx
@@ -5488,7 +5488,7 @@
         </p:nvSpPr>
         <p:spPr>
           <a:xfrm>
-            <a:off x="3108960" y="2560320"/>
+            <a:off x="3290269" y="2569845"/>
             <a:ext cx="1371600" cy="369302"/>
           </a:xfrm>
           <a:prstGeom prst="rect">
@@ -5507,18 +5507,18 @@
           <a:p>
             <a:pPr algn="ctr"/>
             <a:r>
-              <a:rPr lang="en" sz="1200" dirty="0" err="1">
+              <a:rPr lang="en" sz="1200" smtClean="0">
                 <a:latin typeface="Arial" panose="020B0604020202020204" pitchFamily="34" charset="0"/>
                 <a:cs typeface="Arial" panose="020B0604020202020204" pitchFamily="34" charset="0"/>
               </a:rPr>
-              <a:t>EventBridge</a:t>
+              <a:t>EventBridge </a:t>
             </a:r>
             <a:r>
               <a:rPr lang="en" sz="1200" dirty="0">
                 <a:latin typeface="Arial" panose="020B0604020202020204" pitchFamily="34" charset="0"/>
                 <a:cs typeface="Arial" panose="020B0604020202020204" pitchFamily="34" charset="0"/>
               </a:rPr>
-              <a:t> rule</a:t>
+              <a:t>rule</a:t>
             </a:r>
             <a:endParaRPr sz="1200" dirty="0">
               <a:latin typeface="Arial" panose="020B0604020202020204" pitchFamily="34" charset="0"/>
@@ -5543,7 +5543,7 @@
         </p:nvGrpSpPr>
         <p:grpSpPr bwMode="auto">
           <a:xfrm>
-            <a:off x="8654976" y="1871789"/>
+            <a:off x="8836285" y="1871789"/>
             <a:ext cx="1129104" cy="1057833"/>
             <a:chOff x="2674471" y="1567527"/>
             <a:chExt cx="1046639" cy="331243"/>
@@ -5722,7 +5722,7 @@
         </p:nvCxnSpPr>
         <p:spPr>
           <a:xfrm>
-            <a:off x="1018540" y="2331720"/>
+            <a:off x="1199849" y="2331720"/>
             <a:ext cx="993140" cy="0"/>
           </a:xfrm>
           <a:prstGeom prst="straightConnector1">
@@ -5769,7 +5769,7 @@
         </p:nvCxnSpPr>
         <p:spPr>
           <a:xfrm>
-            <a:off x="2468880" y="2331720"/>
+            <a:off x="2650189" y="2331720"/>
             <a:ext cx="1097280" cy="0"/>
           </a:xfrm>
           <a:prstGeom prst="straightConnector1">
@@ -5816,7 +5816,7 @@
         </p:nvCxnSpPr>
         <p:spPr>
           <a:xfrm>
-            <a:off x="7132320" y="2331720"/>
+            <a:off x="7313629" y="2331720"/>
             <a:ext cx="1097280" cy="0"/>
           </a:xfrm>
           <a:prstGeom prst="straightConnector1">
@@ -5863,55 +5863,8 @@
         </p:nvCxnSpPr>
         <p:spPr>
           <a:xfrm>
-            <a:off x="4023360" y="2331720"/>
+            <a:off x="4204669" y="2331720"/>
             <a:ext cx="1097280" cy="0"/>
-          </a:xfrm>
-          <a:prstGeom prst="straightConnector1">
-            <a:avLst/>
-          </a:prstGeom>
-          <a:ln w="12700">
-            <a:solidFill>
-              <a:srgbClr val="545B64"/>
-            </a:solidFill>
-            <a:headEnd type="none" w="med" len="sm"/>
-            <a:tailEnd type="arrow" w="med" len="sm"/>
-          </a:ln>
-        </p:spPr>
-        <p:style>
-          <a:lnRef idx="1">
-            <a:schemeClr val="accent1"/>
-          </a:lnRef>
-          <a:fillRef idx="0">
-            <a:schemeClr val="accent1"/>
-          </a:fillRef>
-          <a:effectRef idx="0">
-            <a:schemeClr val="accent1"/>
-          </a:effectRef>
-          <a:fontRef idx="minor">
-            <a:schemeClr val="tx1"/>
-          </a:fontRef>
-        </p:style>
-      </p:cxnSp>
-      <p:cxnSp>
-        <p:nvCxnSpPr>
-          <p:cNvPr id="122" name="Straight Arrow Connector 121">
-            <a:extLst>
-              <a:ext uri="{FF2B5EF4-FFF2-40B4-BE49-F238E27FC236}">
-                <a16:creationId xmlns:a16="http://schemas.microsoft.com/office/drawing/2014/main" id="{9E8BEF15-E8C4-2242-949A-672EF8C74E91}"/>
-              </a:ext>
-            </a:extLst>
-          </p:cNvPr>
-          <p:cNvCxnSpPr>
-            <a:cxnSpLocks/>
-            <a:stCxn id="156" idx="3"/>
-            <a:endCxn id="155" idx="1"/>
-          </p:cNvCxnSpPr>
-          <p:nvPr/>
-        </p:nvCxnSpPr>
-        <p:spPr>
-          <a:xfrm flipV="1">
-            <a:off x="5828362" y="6985953"/>
-            <a:ext cx="1944038" cy="1436"/>
           </a:xfrm>
           <a:prstGeom prst="straightConnector1">
             <a:avLst/>
@@ -5953,8 +5906,8 @@
         </p:nvSpPr>
         <p:spPr>
           <a:xfrm>
-            <a:off x="1280160" y="640080"/>
-            <a:ext cx="9875520" cy="4937760"/>
+            <a:off x="1461469" y="640080"/>
+            <a:ext cx="9875520" cy="6492240"/>
           </a:xfrm>
           <a:prstGeom prst="rect">
             <a:avLst/>
@@ -6031,7 +5984,7 @@
         </p:blipFill>
         <p:spPr bwMode="auto">
           <a:xfrm>
-            <a:off x="1280160" y="640080"/>
+            <a:off x="1461469" y="640080"/>
             <a:ext cx="330200" cy="330200"/>
           </a:xfrm>
           <a:prstGeom prst="rect">
@@ -6062,228 +6015,6 @@
           </a:extLst>
         </p:spPr>
       </p:pic>
-      <p:sp>
-        <p:nvSpPr>
-          <p:cNvPr id="126" name="Rectangle 125">
-            <a:extLst>
-              <a:ext uri="{FF2B5EF4-FFF2-40B4-BE49-F238E27FC236}">
-                <a16:creationId xmlns:a16="http://schemas.microsoft.com/office/drawing/2014/main" id="{BEFEC4D9-0FF6-0740-BBB7-9A904CD0D43A}"/>
-              </a:ext>
-            </a:extLst>
-          </p:cNvPr>
-          <p:cNvSpPr/>
-          <p:nvPr/>
-        </p:nvSpPr>
-        <p:spPr>
-          <a:xfrm>
-            <a:off x="7589520" y="5852160"/>
-            <a:ext cx="3566160" cy="2011680"/>
-          </a:xfrm>
-          <a:prstGeom prst="rect">
-            <a:avLst/>
-          </a:prstGeom>
-          <a:noFill/>
-          <a:ln w="12700">
-            <a:solidFill>
-              <a:schemeClr val="tx1"/>
-            </a:solidFill>
-          </a:ln>
-        </p:spPr>
-        <p:style>
-          <a:lnRef idx="2">
-            <a:schemeClr val="accent1">
-              <a:shade val="50000"/>
-            </a:schemeClr>
-          </a:lnRef>
-          <a:fillRef idx="1">
-            <a:schemeClr val="accent1"/>
-          </a:fillRef>
-          <a:effectRef idx="0">
-            <a:schemeClr val="accent1"/>
-          </a:effectRef>
-          <a:fontRef idx="minor">
-            <a:schemeClr val="lt1"/>
-          </a:fontRef>
-        </p:style>
-        <p:txBody>
-          <a:bodyPr lIns="457200" tIns="91440"/>
-          <a:lstStyle/>
-          <a:p>
-            <a:pPr>
-              <a:defRPr/>
-            </a:pPr>
-            <a:r>
-              <a:rPr lang="en-US" sz="1400" dirty="0">
-                <a:solidFill>
-                  <a:sysClr val="windowText" lastClr="000000"/>
-                </a:solidFill>
-                <a:latin typeface="Arial" panose="020B0604020202020204" pitchFamily="34" charset="0"/>
-                <a:cs typeface="Arial" panose="020B0604020202020204" pitchFamily="34" charset="0"/>
-              </a:rPr>
-              <a:t>AWS Cloud</a:t>
-            </a:r>
-          </a:p>
-        </p:txBody>
-      </p:sp>
-      <p:pic>
-        <p:nvPicPr>
-          <p:cNvPr id="127" name="Graphic 20">
-            <a:extLst>
-              <a:ext uri="{FF2B5EF4-FFF2-40B4-BE49-F238E27FC236}">
-                <a16:creationId xmlns:a16="http://schemas.microsoft.com/office/drawing/2014/main" id="{3E9996A6-6D01-9B42-8D2D-8C63B84FF81B}"/>
-              </a:ext>
-            </a:extLst>
-          </p:cNvPr>
-          <p:cNvPicPr>
-            <a:picLocks noChangeAspect="1" noChangeArrowheads="1"/>
-          </p:cNvPicPr>
-          <p:nvPr/>
-        </p:nvPicPr>
-        <p:blipFill>
-          <a:blip r:embed="rId3">
-            <a:extLst>
-              <a:ext uri="{28A0092B-C50C-407E-A947-70E740481C1C}">
-                <a14:useLocalDpi xmlns:a14="http://schemas.microsoft.com/office/drawing/2010/main" val="0"/>
-              </a:ext>
-            </a:extLst>
-          </a:blip>
-          <a:srcRect/>
-          <a:stretch>
-            <a:fillRect/>
-          </a:stretch>
-        </p:blipFill>
-        <p:spPr bwMode="auto">
-          <a:xfrm>
-            <a:off x="7589520" y="5852160"/>
-            <a:ext cx="330200" cy="330200"/>
-          </a:xfrm>
-          <a:prstGeom prst="rect">
-            <a:avLst/>
-          </a:prstGeom>
-          <a:noFill/>
-          <a:ln>
-            <a:noFill/>
-          </a:ln>
-          <a:extLst>
-            <a:ext uri="{909E8E84-426E-40DD-AFC4-6F175D3DCCD1}">
-              <a14:hiddenFill xmlns:a14="http://schemas.microsoft.com/office/drawing/2010/main">
-                <a:solidFill>
-                  <a:srgbClr val="FFFFFF"/>
-                </a:solidFill>
-              </a14:hiddenFill>
-            </a:ext>
-            <a:ext uri="{91240B29-F687-4F45-9708-019B960494DF}">
-              <a14:hiddenLine xmlns:a14="http://schemas.microsoft.com/office/drawing/2010/main" w="9525">
-                <a:solidFill>
-                  <a:srgbClr val="000000"/>
-                </a:solidFill>
-                <a:miter lim="800000"/>
-                <a:headEnd/>
-                <a:tailEnd/>
-              </a14:hiddenLine>
-            </a:ext>
-          </a:extLst>
-        </p:spPr>
-      </p:pic>
-      <p:sp>
-        <p:nvSpPr>
-          <p:cNvPr id="128" name="Freeform 127">
-            <a:extLst>
-              <a:ext uri="{FF2B5EF4-FFF2-40B4-BE49-F238E27FC236}">
-                <a16:creationId xmlns:a16="http://schemas.microsoft.com/office/drawing/2014/main" id="{981B9468-3627-724A-A6C3-4EC7CC0B3E02}"/>
-              </a:ext>
-            </a:extLst>
-          </p:cNvPr>
-          <p:cNvSpPr/>
-          <p:nvPr/>
-        </p:nvSpPr>
-        <p:spPr>
-          <a:xfrm rot="5400000" flipH="1">
-            <a:off x="7631621" y="4019739"/>
-            <a:ext cx="2186494" cy="3124265"/>
-          </a:xfrm>
-          <a:custGeom>
-            <a:avLst/>
-            <a:gdLst>
-              <a:gd name="connsiteX0" fmla="*/ 1371600 w 1371600"/>
-              <a:gd name="connsiteY0" fmla="*/ 711200 h 711200"/>
-              <a:gd name="connsiteX1" fmla="*/ 1371600 w 1371600"/>
-              <a:gd name="connsiteY1" fmla="*/ 0 h 711200"/>
-              <a:gd name="connsiteX2" fmla="*/ 0 w 1371600"/>
-              <a:gd name="connsiteY2" fmla="*/ 0 h 711200"/>
-            </a:gdLst>
-            <a:ahLst/>
-            <a:cxnLst>
-              <a:cxn ang="0">
-                <a:pos x="connsiteX0" y="connsiteY0"/>
-              </a:cxn>
-              <a:cxn ang="0">
-                <a:pos x="connsiteX1" y="connsiteY1"/>
-              </a:cxn>
-              <a:cxn ang="0">
-                <a:pos x="connsiteX2" y="connsiteY2"/>
-              </a:cxn>
-            </a:cxnLst>
-            <a:rect l="l" t="t" r="r" b="b"/>
-            <a:pathLst>
-              <a:path w="1371600" h="711200">
-                <a:moveTo>
-                  <a:pt x="1371600" y="711200"/>
-                </a:moveTo>
-                <a:lnTo>
-                  <a:pt x="1371600" y="0"/>
-                </a:lnTo>
-                <a:lnTo>
-                  <a:pt x="0" y="0"/>
-                </a:lnTo>
-              </a:path>
-            </a:pathLst>
-          </a:custGeom>
-          <a:noFill/>
-          <a:ln w="12700">
-            <a:solidFill>
-              <a:srgbClr val="545B64"/>
-            </a:solidFill>
-            <a:headEnd type="none" w="med" len="sm"/>
-            <a:tailEnd type="arrow" w="med" len="sm"/>
-          </a:ln>
-        </p:spPr>
-        <p:style>
-          <a:lnRef idx="2">
-            <a:schemeClr val="accent1">
-              <a:shade val="50000"/>
-            </a:schemeClr>
-          </a:lnRef>
-          <a:fillRef idx="1">
-            <a:schemeClr val="accent1"/>
-          </a:fillRef>
-          <a:effectRef idx="0">
-            <a:schemeClr val="accent1"/>
-          </a:effectRef>
-          <a:fontRef idx="minor">
-            <a:schemeClr val="lt1"/>
-          </a:fontRef>
-        </p:style>
-        <p:txBody>
-          <a:bodyPr anchor="ctr"/>
-          <a:lstStyle/>
-          <a:p>
-            <a:pPr algn="ctr" eaLnBrk="1" fontAlgn="auto" hangingPunct="1">
-              <a:spcBef>
-                <a:spcPts val="0"/>
-              </a:spcBef>
-              <a:spcAft>
-                <a:spcPts val="0"/>
-              </a:spcAft>
-              <a:defRPr/>
-            </a:pPr>
-            <a:endParaRPr lang="en-US" sz="2400" dirty="0">
-              <a:latin typeface="Arial" panose="020B0604020202020204" pitchFamily="34" charset="0"/>
-              <a:cs typeface="Arial" panose="020B0604020202020204" pitchFamily="34" charset="0"/>
-            </a:endParaRPr>
-          </a:p>
-        </p:txBody>
-      </p:sp>
       <p:sp>
         <p:nvSpPr>
           <p:cNvPr id="129" name="Rectangle 128">
@@ -6298,7 +6029,7 @@
         </p:nvSpPr>
         <p:spPr>
           <a:xfrm>
-            <a:off x="1645920" y="1463040"/>
+            <a:off x="1827229" y="1463040"/>
             <a:ext cx="9144000" cy="3749040"/>
           </a:xfrm>
           <a:prstGeom prst="rect">
@@ -6349,7 +6080,7 @@
                 <a:latin typeface="Arial" panose="020B0604020202020204" pitchFamily="34" charset="0"/>
                 <a:cs typeface="Arial" panose="020B0604020202020204" pitchFamily="34" charset="0"/>
               </a:rPr>
-              <a:t>Region</a:t>
+              <a:t>AWS Control Tower home Region</a:t>
             </a:r>
             <a:endParaRPr lang="en-US" sz="1400" dirty="0">
               <a:solidFill>
@@ -6390,7 +6121,7 @@
         </p:blipFill>
         <p:spPr bwMode="auto">
           <a:xfrm>
-            <a:off x="1645920" y="1463040"/>
+            <a:off x="1827229" y="1463040"/>
             <a:ext cx="330200" cy="330200"/>
           </a:xfrm>
           <a:prstGeom prst="rect">
@@ -6435,7 +6166,7 @@
         </p:nvSpPr>
         <p:spPr>
           <a:xfrm>
-            <a:off x="1463040" y="1097280"/>
+            <a:off x="1644349" y="1097280"/>
             <a:ext cx="9509760" cy="4297680"/>
           </a:xfrm>
           <a:prstGeom prst="rect">
@@ -6469,7 +6200,7 @@
           <a:bodyPr tIns="91440"/>
           <a:lstStyle/>
           <a:p>
-            <a:pPr algn="ctr" eaLnBrk="1" fontAlgn="auto" hangingPunct="1">
+            <a:pPr eaLnBrk="1" fontAlgn="auto" hangingPunct="1">
               <a:spcBef>
                 <a:spcPts val="0"/>
               </a:spcBef>
@@ -6486,7 +6217,7 @@
                 <a:latin typeface="Arial" panose="020B0604020202020204" pitchFamily="34" charset="0"/>
                 <a:cs typeface="Arial" panose="020B0604020202020204" pitchFamily="34" charset="0"/>
               </a:rPr>
-              <a:t>AWS management account</a:t>
+              <a:t>AWS Control Tower management account</a:t>
             </a:r>
             <a:endParaRPr lang="en-US" sz="1400" dirty="0">
               <a:solidFill>
@@ -6514,7 +6245,7 @@
         </p:nvSpPr>
         <p:spPr bwMode="auto">
           <a:xfrm>
-            <a:off x="4677715" y="4211331"/>
+            <a:off x="1745321" y="4128749"/>
             <a:ext cx="1362074" cy="461665"/>
           </a:xfrm>
           <a:prstGeom prst="rect">
@@ -6693,7 +6424,7 @@
         </p:blipFill>
         <p:spPr bwMode="auto">
           <a:xfrm>
-            <a:off x="5120640" y="3657600"/>
+            <a:off x="2192989" y="3657600"/>
             <a:ext cx="457200" cy="457200"/>
           </a:xfrm>
           <a:prstGeom prst="rect">
@@ -6753,7 +6484,7 @@
         </p:blipFill>
         <p:spPr bwMode="auto">
           <a:xfrm>
-            <a:off x="8229600" y="2103120"/>
+            <a:off x="8410909" y="2103120"/>
             <a:ext cx="457200" cy="457200"/>
           </a:xfrm>
           <a:prstGeom prst="rect">
@@ -6813,7 +6544,7 @@
         </p:blipFill>
         <p:spPr bwMode="auto">
           <a:xfrm>
-            <a:off x="5120640" y="2103120"/>
+            <a:off x="5301949" y="2103120"/>
             <a:ext cx="457200" cy="457200"/>
           </a:xfrm>
           <a:prstGeom prst="rect">
@@ -6873,7 +6604,7 @@
         </p:blipFill>
         <p:spPr bwMode="auto">
           <a:xfrm>
-            <a:off x="3566160" y="2103120"/>
+            <a:off x="3747469" y="2103120"/>
             <a:ext cx="457200" cy="457200"/>
           </a:xfrm>
           <a:prstGeom prst="rect">
@@ -6931,7 +6662,7 @@
         </p:blipFill>
         <p:spPr bwMode="auto">
           <a:xfrm>
-            <a:off x="548640" y="2096770"/>
+            <a:off x="729949" y="2096770"/>
             <a:ext cx="469900" cy="469900"/>
           </a:xfrm>
           <a:prstGeom prst="rect">
@@ -6978,7 +6709,7 @@
         </p:nvSpPr>
         <p:spPr bwMode="auto">
           <a:xfrm>
-            <a:off x="248920" y="2560320"/>
+            <a:off x="420704" y="2569845"/>
             <a:ext cx="1097280" cy="461665"/>
           </a:xfrm>
           <a:prstGeom prst="rect">
@@ -7148,7 +6879,7 @@
         </p:nvSpPr>
         <p:spPr bwMode="auto">
           <a:xfrm>
-            <a:off x="9518508" y="2002808"/>
+            <a:off x="9699817" y="2012333"/>
             <a:ext cx="1005840" cy="457200"/>
           </a:xfrm>
           <a:prstGeom prst="rect">
@@ -7327,7 +7058,7 @@
         </p:blipFill>
         <p:spPr bwMode="auto">
           <a:xfrm>
-            <a:off x="9784080" y="1645920"/>
+            <a:off x="9965389" y="1645920"/>
             <a:ext cx="457200" cy="457200"/>
           </a:xfrm>
           <a:prstGeom prst="rect">
@@ -7374,7 +7105,7 @@
         </p:nvSpPr>
         <p:spPr bwMode="auto">
           <a:xfrm>
-            <a:off x="6266575" y="2568725"/>
+            <a:off x="6537120" y="2568725"/>
             <a:ext cx="1097280" cy="461665"/>
           </a:xfrm>
           <a:prstGeom prst="rect">
@@ -7553,7 +7284,7 @@
         </p:blipFill>
         <p:spPr bwMode="auto">
           <a:xfrm>
-            <a:off x="6675120" y="2103120"/>
+            <a:off x="6856429" y="2103120"/>
             <a:ext cx="457200" cy="457200"/>
           </a:xfrm>
           <a:prstGeom prst="rect">
@@ -7600,8 +7331,8 @@
         </p:nvSpPr>
         <p:spPr bwMode="auto">
           <a:xfrm>
-            <a:off x="6268578" y="3571611"/>
-            <a:ext cx="1385885" cy="276999"/>
+            <a:off x="3428212" y="3668583"/>
+            <a:ext cx="1097280" cy="276999"/>
           </a:xfrm>
           <a:prstGeom prst="rect">
             <a:avLst/>
@@ -7740,7 +7471,7 @@
                 <a:ea typeface="Amazon Ember" panose="020B0603020204020204" pitchFamily="34" charset="0"/>
                 <a:cs typeface="Arial" panose="020B0604020202020204" pitchFamily="34" charset="0"/>
               </a:rPr>
-              <a:t>Stack SNS</a:t>
+              <a:t>Stack SNS topic</a:t>
             </a:r>
           </a:p>
         </p:txBody>
@@ -7774,7 +7505,7 @@
         </p:blipFill>
         <p:spPr bwMode="auto">
           <a:xfrm>
-            <a:off x="6675120" y="3200400"/>
+            <a:off x="3747469" y="3200400"/>
             <a:ext cx="457200" cy="457200"/>
           </a:xfrm>
           <a:prstGeom prst="rect">
@@ -7821,7 +7552,7 @@
         </p:nvSpPr>
         <p:spPr bwMode="auto">
           <a:xfrm>
-            <a:off x="1737360" y="2560320"/>
+            <a:off x="1918669" y="2569845"/>
             <a:ext cx="1005840" cy="461665"/>
           </a:xfrm>
           <a:prstGeom prst="rect">
@@ -7961,15 +7692,7 @@
                 <a:ea typeface="Amazon Ember" panose="020B0603020204020204" pitchFamily="34" charset="0"/>
                 <a:cs typeface="Arial" panose="020B0604020202020204" pitchFamily="34" charset="0"/>
               </a:rPr>
-              <a:t>New a</a:t>
-            </a:r>
-            <a:r>
-              <a:rPr lang="en-US" altLang="en-US" sz="1200" smtClean="0">
-                <a:latin typeface="Arial" panose="020B0604020202020204" pitchFamily="34" charset="0"/>
-                <a:ea typeface="Amazon Ember" panose="020B0603020204020204" pitchFamily="34" charset="0"/>
-                <a:cs typeface="Arial" panose="020B0604020202020204" pitchFamily="34" charset="0"/>
-              </a:rPr>
-              <a:t>ccount</a:t>
+              <a:t>New account</a:t>
             </a:r>
             <a:endParaRPr lang="en-US" altLang="en-US" sz="1200" dirty="0">
               <a:latin typeface="Arial" panose="020B0604020202020204" pitchFamily="34" charset="0"/>
@@ -8006,7 +7729,7 @@
         </p:blipFill>
         <p:spPr bwMode="auto">
           <a:xfrm>
-            <a:off x="2011680" y="2103120"/>
+            <a:off x="2192989" y="2103120"/>
             <a:ext cx="457200" cy="457200"/>
           </a:xfrm>
           <a:prstGeom prst="rect">
@@ -8053,7 +7776,7 @@
         </p:nvSpPr>
         <p:spPr bwMode="auto">
           <a:xfrm>
-            <a:off x="9358009" y="3059900"/>
+            <a:off x="9520268" y="3050375"/>
             <a:ext cx="1345310" cy="461665"/>
           </a:xfrm>
           <a:prstGeom prst="rect">
@@ -8232,7 +7955,7 @@
         </p:blipFill>
         <p:spPr bwMode="auto">
           <a:xfrm>
-            <a:off x="9784080" y="2692704"/>
+            <a:off x="9965389" y="2692704"/>
             <a:ext cx="457200" cy="457200"/>
           </a:xfrm>
           <a:prstGeom prst="rect">
@@ -8279,8 +8002,8 @@
         </p:nvSpPr>
         <p:spPr bwMode="auto">
           <a:xfrm>
-            <a:off x="6501382" y="4729234"/>
-            <a:ext cx="914400" cy="548640"/>
+            <a:off x="5074597" y="4658287"/>
+            <a:ext cx="914400" cy="461665"/>
           </a:xfrm>
           <a:prstGeom prst="rect">
             <a:avLst/>
@@ -8419,7 +8142,7 @@
                 <a:ea typeface="Amazon Ember" panose="020B0603020204020204" pitchFamily="34" charset="0"/>
                 <a:cs typeface="Arial" panose="020B0604020202020204" pitchFamily="34" charset="0"/>
               </a:rPr>
-              <a:t>New Relic stack set</a:t>
+              <a:t>New Relic StackSet</a:t>
             </a:r>
             <a:endParaRPr lang="en-US" altLang="en-US" sz="1200" dirty="0">
               <a:latin typeface="Arial" panose="020B0604020202020204" pitchFamily="34" charset="0"/>
@@ -8458,7 +8181,7 @@
         </p:blipFill>
         <p:spPr bwMode="auto">
           <a:xfrm>
-            <a:off x="6675120" y="4297680"/>
+            <a:off x="5303516" y="4195201"/>
             <a:ext cx="457200" cy="457200"/>
           </a:xfrm>
           <a:prstGeom prst="rect">
@@ -8505,7 +8228,7 @@
         </p:nvSpPr>
         <p:spPr bwMode="auto">
           <a:xfrm>
-            <a:off x="9738360" y="7131250"/>
+            <a:off x="4985039" y="6454970"/>
             <a:ext cx="1097280" cy="461665"/>
           </a:xfrm>
           <a:prstGeom prst="rect">
@@ -8684,7 +8407,7 @@
         </p:blipFill>
         <p:spPr bwMode="auto">
           <a:xfrm>
-            <a:off x="10058400" y="6675120"/>
+            <a:off x="5305079" y="5989315"/>
             <a:ext cx="457200" cy="457200"/>
           </a:xfrm>
           <a:prstGeom prst="rect">
@@ -8731,7 +8454,7 @@
         </p:nvSpPr>
         <p:spPr bwMode="auto">
           <a:xfrm>
-            <a:off x="7979976" y="7068299"/>
+            <a:off x="3521930" y="6455664"/>
             <a:ext cx="914400" cy="461665"/>
           </a:xfrm>
           <a:prstGeom prst="rect">
@@ -8871,15 +8594,7 @@
                 <a:ea typeface="Amazon Ember" panose="020B0603020204020204" pitchFamily="34" charset="0"/>
                 <a:cs typeface="Arial" panose="020B0604020202020204" pitchFamily="34" charset="0"/>
               </a:rPr>
-              <a:t>Integration IAM r</a:t>
-            </a:r>
-            <a:r>
-              <a:rPr lang="en-US" altLang="en-US" sz="1200" smtClean="0">
-                <a:latin typeface="Arial" panose="020B0604020202020204" pitchFamily="34" charset="0"/>
-                <a:ea typeface="Amazon Ember" panose="020B0603020204020204" pitchFamily="34" charset="0"/>
-                <a:cs typeface="Arial" panose="020B0604020202020204" pitchFamily="34" charset="0"/>
-              </a:rPr>
-              <a:t>ole</a:t>
+              <a:t>Integration IAM role</a:t>
             </a:r>
             <a:endParaRPr lang="en-US" altLang="en-US" sz="1200" dirty="0">
               <a:latin typeface="Arial" panose="020B0604020202020204" pitchFamily="34" charset="0"/>
@@ -8918,7 +8633,7 @@
         </p:blipFill>
         <p:spPr bwMode="auto">
           <a:xfrm>
-            <a:off x="8138160" y="6675120"/>
+            <a:off x="3749040" y="5989315"/>
             <a:ext cx="457200" cy="457200"/>
           </a:xfrm>
           <a:prstGeom prst="rect">
@@ -8963,8 +8678,8 @@
         </p:nvSpPr>
         <p:spPr>
           <a:xfrm>
-            <a:off x="7772400" y="6345873"/>
-            <a:ext cx="3200400" cy="1280160"/>
+            <a:off x="3383280" y="5577840"/>
+            <a:ext cx="2651760" cy="1371600"/>
           </a:xfrm>
           <a:prstGeom prst="rect">
             <a:avLst/>
@@ -9048,7 +8763,7 @@
         </p:blipFill>
         <p:spPr>
           <a:xfrm>
-            <a:off x="4663440" y="6515100"/>
+            <a:off x="181309" y="5748084"/>
             <a:ext cx="1164922" cy="944577"/>
           </a:xfrm>
           <a:prstGeom prst="rect">
@@ -9072,7 +8787,7 @@
         </p:nvSpPr>
         <p:spPr bwMode="auto">
           <a:xfrm>
-            <a:off x="7815185" y="2541745"/>
+            <a:off x="7958394" y="2570320"/>
             <a:ext cx="1362074" cy="461665"/>
           </a:xfrm>
           <a:prstGeom prst="rect">
@@ -9238,8 +8953,8 @@
         </p:nvSpPr>
         <p:spPr bwMode="auto">
           <a:xfrm>
-            <a:off x="4663440" y="2560320"/>
-            <a:ext cx="1371600" cy="548640"/>
+            <a:off x="4844749" y="2568203"/>
+            <a:ext cx="1371600" cy="457200"/>
           </a:xfrm>
           <a:prstGeom prst="rect">
             <a:avLst/>
@@ -9404,7 +9119,7 @@
         </p:nvSpPr>
         <p:spPr bwMode="auto">
           <a:xfrm>
-            <a:off x="2468880" y="1862920"/>
+            <a:off x="2650189" y="1862920"/>
             <a:ext cx="1097280" cy="461665"/>
           </a:xfrm>
           <a:prstGeom prst="rect">
@@ -9572,7 +9287,7 @@
         </p:nvCxnSpPr>
         <p:spPr>
           <a:xfrm>
-            <a:off x="5577840" y="2331720"/>
+            <a:off x="5759149" y="2331720"/>
             <a:ext cx="1097280" cy="0"/>
           </a:xfrm>
           <a:prstGeom prst="straightConnector1">
@@ -9617,10 +9332,10 @@
         </p:nvGrpSpPr>
         <p:grpSpPr bwMode="auto">
           <a:xfrm>
-            <a:off x="5571303" y="3430792"/>
-            <a:ext cx="1073402" cy="1057833"/>
-            <a:chOff x="2674471" y="1567527"/>
-            <a:chExt cx="1046639" cy="331243"/>
+            <a:off x="2650189" y="3430787"/>
+            <a:ext cx="1097280" cy="991436"/>
+            <a:chOff x="2674471" y="1567526"/>
+            <a:chExt cx="1076294" cy="310452"/>
           </a:xfrm>
         </p:grpSpPr>
         <p:sp>
@@ -9637,8 +9352,8 @@
           </p:nvSpPr>
           <p:spPr>
             <a:xfrm rot="10800000">
-              <a:off x="3247894" y="1567527"/>
-              <a:ext cx="473216" cy="331243"/>
+              <a:off x="3247893" y="1567526"/>
+              <a:ext cx="502872" cy="310452"/>
             </a:xfrm>
             <a:custGeom>
               <a:avLst/>
@@ -9698,7 +9413,7 @@
               <a:solidFill>
                 <a:srgbClr val="545B64"/>
               </a:solidFill>
-              <a:headEnd type="arrow" w="med" len="sm"/>
+              <a:headEnd type="none" w="med" len="sm"/>
               <a:tailEnd type="arrow" w="med" len="sm"/>
             </a:ln>
           </p:spPr>
@@ -9778,6 +9493,289 @@
           </p:style>
         </p:cxnSp>
       </p:grpSp>
+      <p:cxnSp>
+        <p:nvCxnSpPr>
+          <p:cNvPr id="55" name="Straight Arrow Connector 54">
+            <a:extLst>
+              <a:ext uri="{FF2B5EF4-FFF2-40B4-BE49-F238E27FC236}">
+                <a16:creationId xmlns:a16="http://schemas.microsoft.com/office/drawing/2014/main" id="{9E8BEF15-E8C4-2242-949A-672EF8C74E91}"/>
+              </a:ext>
+            </a:extLst>
+          </p:cNvPr>
+          <p:cNvCxnSpPr>
+            <a:cxnSpLocks/>
+            <a:stCxn id="158" idx="2"/>
+            <a:endCxn id="150" idx="0"/>
+          </p:cNvCxnSpPr>
+          <p:nvPr/>
+        </p:nvCxnSpPr>
+        <p:spPr>
+          <a:xfrm>
+            <a:off x="5530549" y="3025403"/>
+            <a:ext cx="1567" cy="1169798"/>
+          </a:xfrm>
+          <a:prstGeom prst="straightConnector1">
+            <a:avLst/>
+          </a:prstGeom>
+          <a:ln w="12700">
+            <a:solidFill>
+              <a:srgbClr val="545B64"/>
+            </a:solidFill>
+            <a:headEnd type="none" w="med" len="sm"/>
+            <a:tailEnd type="arrow" w="med" len="sm"/>
+          </a:ln>
+        </p:spPr>
+        <p:style>
+          <a:lnRef idx="1">
+            <a:schemeClr val="accent1"/>
+          </a:lnRef>
+          <a:fillRef idx="0">
+            <a:schemeClr val="accent1"/>
+          </a:fillRef>
+          <a:effectRef idx="0">
+            <a:schemeClr val="accent1"/>
+          </a:effectRef>
+          <a:fontRef idx="minor">
+            <a:schemeClr val="tx1"/>
+          </a:fontRef>
+        </p:style>
+      </p:cxnSp>
+      <p:cxnSp>
+        <p:nvCxnSpPr>
+          <p:cNvPr id="58" name="Straight Arrow Connector 57">
+            <a:extLst>
+              <a:ext uri="{FF2B5EF4-FFF2-40B4-BE49-F238E27FC236}">
+                <a16:creationId xmlns:a16="http://schemas.microsoft.com/office/drawing/2014/main" id="{9E8BEF15-E8C4-2242-949A-672EF8C74E91}"/>
+              </a:ext>
+            </a:extLst>
+          </p:cNvPr>
+          <p:cNvCxnSpPr>
+            <a:cxnSpLocks/>
+            <a:stCxn id="166" idx="1"/>
+            <a:endCxn id="150" idx="1"/>
+          </p:cNvCxnSpPr>
+          <p:nvPr/>
+        </p:nvCxnSpPr>
+        <p:spPr>
+          <a:xfrm>
+            <a:off x="3234792" y="4422223"/>
+            <a:ext cx="2068724" cy="1578"/>
+          </a:xfrm>
+          <a:prstGeom prst="straightConnector1">
+            <a:avLst/>
+          </a:prstGeom>
+          <a:ln w="12700">
+            <a:solidFill>
+              <a:srgbClr val="545B64"/>
+            </a:solidFill>
+            <a:headEnd type="none" w="med" len="sm"/>
+            <a:tailEnd type="arrow" w="med" len="sm"/>
+          </a:ln>
+        </p:spPr>
+        <p:style>
+          <a:lnRef idx="1">
+            <a:schemeClr val="accent1"/>
+          </a:lnRef>
+          <a:fillRef idx="0">
+            <a:schemeClr val="accent1"/>
+          </a:fillRef>
+          <a:effectRef idx="0">
+            <a:schemeClr val="accent1"/>
+          </a:effectRef>
+          <a:fontRef idx="minor">
+            <a:schemeClr val="tx1"/>
+          </a:fontRef>
+        </p:style>
+      </p:cxnSp>
+      <p:cxnSp>
+        <p:nvCxnSpPr>
+          <p:cNvPr id="70" name="Straight Arrow Connector 69">
+            <a:extLst>
+              <a:ext uri="{FF2B5EF4-FFF2-40B4-BE49-F238E27FC236}">
+                <a16:creationId xmlns:a16="http://schemas.microsoft.com/office/drawing/2014/main" id="{9E8BEF15-E8C4-2242-949A-672EF8C74E91}"/>
+              </a:ext>
+            </a:extLst>
+          </p:cNvPr>
+          <p:cNvCxnSpPr>
+            <a:cxnSpLocks/>
+            <a:stCxn id="149" idx="2"/>
+            <a:endCxn id="152" idx="0"/>
+          </p:cNvCxnSpPr>
+          <p:nvPr/>
+        </p:nvCxnSpPr>
+        <p:spPr>
+          <a:xfrm>
+            <a:off x="5531797" y="5119952"/>
+            <a:ext cx="1882" cy="869363"/>
+          </a:xfrm>
+          <a:prstGeom prst="straightConnector1">
+            <a:avLst/>
+          </a:prstGeom>
+          <a:ln w="12700">
+            <a:solidFill>
+              <a:srgbClr val="545B64"/>
+            </a:solidFill>
+            <a:headEnd type="none" w="med" len="sm"/>
+            <a:tailEnd type="arrow" w="med" len="sm"/>
+          </a:ln>
+        </p:spPr>
+        <p:style>
+          <a:lnRef idx="1">
+            <a:schemeClr val="accent1"/>
+          </a:lnRef>
+          <a:fillRef idx="0">
+            <a:schemeClr val="accent1"/>
+          </a:fillRef>
+          <a:effectRef idx="0">
+            <a:schemeClr val="accent1"/>
+          </a:effectRef>
+          <a:fontRef idx="minor">
+            <a:schemeClr val="tx1"/>
+          </a:fontRef>
+        </p:style>
+      </p:cxnSp>
+      <p:cxnSp>
+        <p:nvCxnSpPr>
+          <p:cNvPr id="76" name="Straight Arrow Connector 75">
+            <a:extLst>
+              <a:ext uri="{FF2B5EF4-FFF2-40B4-BE49-F238E27FC236}">
+                <a16:creationId xmlns:a16="http://schemas.microsoft.com/office/drawing/2014/main" id="{9E8BEF15-E8C4-2242-949A-672EF8C74E91}"/>
+              </a:ext>
+            </a:extLst>
+          </p:cNvPr>
+          <p:cNvCxnSpPr>
+            <a:cxnSpLocks/>
+            <a:endCxn id="154" idx="1"/>
+          </p:cNvCxnSpPr>
+          <p:nvPr/>
+        </p:nvCxnSpPr>
+        <p:spPr>
+          <a:xfrm>
+            <a:off x="1393031" y="6217915"/>
+            <a:ext cx="2356009" cy="0"/>
+          </a:xfrm>
+          <a:prstGeom prst="straightConnector1">
+            <a:avLst/>
+          </a:prstGeom>
+          <a:ln w="12700">
+            <a:solidFill>
+              <a:srgbClr val="545B64"/>
+            </a:solidFill>
+            <a:headEnd type="none" w="med" len="sm"/>
+            <a:tailEnd type="arrow" w="med" len="sm"/>
+          </a:ln>
+        </p:spPr>
+        <p:style>
+          <a:lnRef idx="1">
+            <a:schemeClr val="accent1"/>
+          </a:lnRef>
+          <a:fillRef idx="0">
+            <a:schemeClr val="accent1"/>
+          </a:fillRef>
+          <a:effectRef idx="0">
+            <a:schemeClr val="accent1"/>
+          </a:effectRef>
+          <a:fontRef idx="minor">
+            <a:schemeClr val="tx1"/>
+          </a:fontRef>
+        </p:style>
+      </p:cxnSp>
+      <p:sp>
+        <p:nvSpPr>
+          <p:cNvPr id="52" name="Freeform 51">
+            <a:extLst>
+              <a:ext uri="{FF2B5EF4-FFF2-40B4-BE49-F238E27FC236}">
+                <a16:creationId xmlns:a16="http://schemas.microsoft.com/office/drawing/2014/main" id="{981B9468-3627-724A-A6C3-4EC7CC0B3E02}"/>
+              </a:ext>
+            </a:extLst>
+          </p:cNvPr>
+          <p:cNvSpPr/>
+          <p:nvPr/>
+        </p:nvSpPr>
+        <p:spPr>
+          <a:xfrm rot="5400000">
+            <a:off x="4587059" y="2668389"/>
+            <a:ext cx="378624" cy="1142596"/>
+          </a:xfrm>
+          <a:custGeom>
+            <a:avLst/>
+            <a:gdLst>
+              <a:gd name="connsiteX0" fmla="*/ 1371600 w 1371600"/>
+              <a:gd name="connsiteY0" fmla="*/ 711200 h 711200"/>
+              <a:gd name="connsiteX1" fmla="*/ 1371600 w 1371600"/>
+              <a:gd name="connsiteY1" fmla="*/ 0 h 711200"/>
+              <a:gd name="connsiteX2" fmla="*/ 0 w 1371600"/>
+              <a:gd name="connsiteY2" fmla="*/ 0 h 711200"/>
+            </a:gdLst>
+            <a:ahLst/>
+            <a:cxnLst>
+              <a:cxn ang="0">
+                <a:pos x="connsiteX0" y="connsiteY0"/>
+              </a:cxn>
+              <a:cxn ang="0">
+                <a:pos x="connsiteX1" y="connsiteY1"/>
+              </a:cxn>
+              <a:cxn ang="0">
+                <a:pos x="connsiteX2" y="connsiteY2"/>
+              </a:cxn>
+            </a:cxnLst>
+            <a:rect l="l" t="t" r="r" b="b"/>
+            <a:pathLst>
+              <a:path w="1371600" h="711200">
+                <a:moveTo>
+                  <a:pt x="1371600" y="711200"/>
+                </a:moveTo>
+                <a:lnTo>
+                  <a:pt x="1371600" y="0"/>
+                </a:lnTo>
+                <a:lnTo>
+                  <a:pt x="0" y="0"/>
+                </a:lnTo>
+              </a:path>
+            </a:pathLst>
+          </a:custGeom>
+          <a:noFill/>
+          <a:ln w="12700">
+            <a:solidFill>
+              <a:srgbClr val="545B64"/>
+            </a:solidFill>
+            <a:headEnd type="none" w="med" len="sm"/>
+            <a:tailEnd type="arrow" w="med" len="sm"/>
+          </a:ln>
+        </p:spPr>
+        <p:style>
+          <a:lnRef idx="2">
+            <a:schemeClr val="accent1">
+              <a:shade val="50000"/>
+            </a:schemeClr>
+          </a:lnRef>
+          <a:fillRef idx="1">
+            <a:schemeClr val="accent1"/>
+          </a:fillRef>
+          <a:effectRef idx="0">
+            <a:schemeClr val="accent1"/>
+          </a:effectRef>
+          <a:fontRef idx="minor">
+            <a:schemeClr val="lt1"/>
+          </a:fontRef>
+        </p:style>
+        <p:txBody>
+          <a:bodyPr anchor="ctr"/>
+          <a:lstStyle/>
+          <a:p>
+            <a:pPr algn="ctr" eaLnBrk="1" fontAlgn="auto" hangingPunct="1">
+              <a:spcBef>
+                <a:spcPts val="0"/>
+              </a:spcBef>
+              <a:spcAft>
+                <a:spcPts val="0"/>
+              </a:spcAft>
+              <a:defRPr/>
+            </a:pPr>
+            <a:endParaRPr lang="en-US" dirty="0"/>
+          </a:p>
+        </p:txBody>
+      </p:sp>
     </p:spTree>
     <p:extLst>
       <p:ext uri="{BB962C8B-B14F-4D97-AF65-F5344CB8AC3E}">

</xml_diff>